<commit_message>
Some lecture files that were left behind.
</commit_message>
<xml_diff>
--- a/slides/InstrumentControl.pptx
+++ b/slides/InstrumentControl.pptx
@@ -14336,25 +14336,6 @@
       </p:sp>
       <p:sp>
         <p:nvSpPr>
-          <p:cNvPr id="3" name="Content Placeholder 2"/>
-          <p:cNvSpPr>
-            <a:spLocks noGrp="1"/>
-          </p:cNvSpPr>
-          <p:nvPr>
-            <p:ph idx="1"/>
-          </p:nvPr>
-        </p:nvSpPr>
-        <p:spPr/>
-        <p:txBody>
-          <a:bodyPr/>
-          <a:lstStyle/>
-          <a:p>
-            <a:endParaRPr lang="en-US"/>
-          </a:p>
-        </p:txBody>
-      </p:sp>
-      <p:sp>
-        <p:nvSpPr>
           <p:cNvPr id="4" name="Date Placeholder 3"/>
           <p:cNvSpPr>
             <a:spLocks noGrp="1"/>

</xml_diff>